<commit_message>
last mod to ppt
</commit_message>
<xml_diff>
--- a/Deliveries/GasSentinel2.pptx
+++ b/Deliveries/GasSentinel2.pptx
@@ -16,7 +16,6 @@
     <p:sldId id="266" r:id="rId10"/>
     <p:sldId id="267" r:id="rId11"/>
     <p:sldId id="268" r:id="rId12"/>
-    <p:sldId id="269" r:id="rId13"/>
   </p:sldIdLst>
   <p:sldSz cx="12192000" cy="6858000"/>
   <p:notesSz cx="6858000" cy="9144000"/>
@@ -3290,6 +3289,91 @@
           </p:txBody>
         </p:sp>
       </p:grpSp>
+      <p:sp>
+        <p:nvSpPr>
+          <p:cNvPr id="6" name="CasellaDiTesto 5">
+            <a:extLst>
+              <a:ext uri="{FF2B5EF4-FFF2-40B4-BE49-F238E27FC236}">
+                <a16:creationId xmlns:a16="http://schemas.microsoft.com/office/drawing/2014/main" id="{D4B8D828-D431-2026-257A-0A2A1AE288BE}"/>
+              </a:ext>
+            </a:extLst>
+          </p:cNvPr>
+          <p:cNvSpPr txBox="1"/>
+          <p:nvPr/>
+        </p:nvSpPr>
+        <p:spPr>
+          <a:xfrm>
+            <a:off x="280909" y="5664867"/>
+            <a:ext cx="1781385" cy="826508"/>
+          </a:xfrm>
+          <a:prstGeom prst="rect">
+            <a:avLst/>
+          </a:prstGeom>
+          <a:noFill/>
+        </p:spPr>
+        <p:txBody>
+          <a:bodyPr wrap="none" rtlCol="0">
+            <a:spAutoFit/>
+          </a:bodyPr>
+          <a:lstStyle/>
+          <a:p>
+            <a:pPr defTabSz="609630">
+              <a:lnSpc>
+                <a:spcPts val="2987"/>
+              </a:lnSpc>
+            </a:pPr>
+            <a:r>
+              <a:rPr lang="it-IT" sz="1800" dirty="0">
+                <a:solidFill>
+                  <a:srgbClr val="002211"/>
+                </a:solidFill>
+                <a:latin typeface="Open Sauce Light"/>
+              </a:rPr>
+              <a:t>Domenico Lattari</a:t>
+            </a:r>
+          </a:p>
+          <a:p>
+            <a:pPr defTabSz="609630">
+              <a:lnSpc>
+                <a:spcPts val="2987"/>
+              </a:lnSpc>
+            </a:pPr>
+            <a:r>
+              <a:rPr lang="it-IT" dirty="0" err="1">
+                <a:solidFill>
+                  <a:srgbClr val="002211"/>
+                </a:solidFill>
+                <a:latin typeface="Open Sauce Light"/>
+              </a:rPr>
+              <a:t>Shlok</a:t>
+            </a:r>
+            <a:r>
+              <a:rPr lang="it-IT" dirty="0">
+                <a:solidFill>
+                  <a:srgbClr val="002211"/>
+                </a:solidFill>
+                <a:latin typeface="Open Sauce Light"/>
+              </a:rPr>
+              <a:t> </a:t>
+            </a:r>
+            <a:r>
+              <a:rPr lang="it-IT" dirty="0" err="1">
+                <a:solidFill>
+                  <a:srgbClr val="002211"/>
+                </a:solidFill>
+                <a:latin typeface="Open Sauce Light"/>
+              </a:rPr>
+              <a:t>Bharuka</a:t>
+            </a:r>
+            <a:endParaRPr lang="en-US" sz="1800" dirty="0">
+              <a:solidFill>
+                <a:srgbClr val="002211"/>
+              </a:solidFill>
+              <a:latin typeface="Open Sauce Light"/>
+            </a:endParaRPr>
+          </a:p>
+        </p:txBody>
+      </p:sp>
     </p:spTree>
   </p:cSld>
   <p:clrMapOvr>
@@ -4036,232 +4120,6 @@
 </p:sld>
 </file>
 
-<file path=ppt/slides/slide12.xml><?xml version="1.0" encoding="utf-8"?>
-<p:sld xmlns:a="http://schemas.openxmlformats.org/drawingml/2006/main" xmlns:r="http://schemas.openxmlformats.org/officeDocument/2006/relationships" xmlns:p="http://schemas.openxmlformats.org/presentationml/2006/main">
-  <p:cSld>
-    <p:bg>
-      <p:bgPr>
-        <a:solidFill>
-          <a:srgbClr val="C1D0BD"/>
-        </a:solidFill>
-        <a:effectLst/>
-      </p:bgPr>
-    </p:bg>
-    <p:spTree>
-      <p:nvGrpSpPr>
-        <p:cNvPr id="1" name=""/>
-        <p:cNvGrpSpPr/>
-        <p:nvPr/>
-      </p:nvGrpSpPr>
-      <p:grpSpPr>
-        <a:xfrm>
-          <a:off x="0" y="0"/>
-          <a:ext cx="0" cy="0"/>
-          <a:chOff x="0" y="0"/>
-          <a:chExt cx="0" cy="0"/>
-        </a:xfrm>
-      </p:grpSpPr>
-      <p:sp>
-        <p:nvSpPr>
-          <p:cNvPr id="3" name="TextBox 3"/>
-          <p:cNvSpPr txBox="1"/>
-          <p:nvPr/>
-        </p:nvSpPr>
-        <p:spPr>
-          <a:xfrm>
-            <a:off x="275856" y="1449076"/>
-            <a:ext cx="7008415" cy="1077924"/>
-          </a:xfrm>
-          <a:prstGeom prst="rect">
-            <a:avLst/>
-          </a:prstGeom>
-        </p:spPr>
-        <p:txBody>
-          <a:bodyPr lIns="0" tIns="0" rIns="0" bIns="0" rtlCol="0" anchor="t">
-            <a:spAutoFit/>
-          </a:bodyPr>
-          <a:lstStyle/>
-          <a:p>
-            <a:pPr marL="457200" indent="-457200" defTabSz="609630">
-              <a:lnSpc>
-                <a:spcPts val="4300"/>
-              </a:lnSpc>
-              <a:buFont typeface="Arial" panose="020B0604020202020204" pitchFamily="34" charset="0"/>
-              <a:buChar char="•"/>
-            </a:pPr>
-            <a:endParaRPr lang="en-US" sz="3334" dirty="0">
-              <a:solidFill>
-                <a:srgbClr val="000000"/>
-              </a:solidFill>
-              <a:latin typeface="Open Sauce Heavy"/>
-            </a:endParaRPr>
-          </a:p>
-          <a:p>
-            <a:pPr defTabSz="609630">
-              <a:lnSpc>
-                <a:spcPts val="4300"/>
-              </a:lnSpc>
-              <a:spcBef>
-                <a:spcPct val="0"/>
-              </a:spcBef>
-            </a:pPr>
-            <a:endParaRPr lang="en-US" sz="3334" dirty="0">
-              <a:solidFill>
-                <a:srgbClr val="000000"/>
-              </a:solidFill>
-              <a:latin typeface="Open Sauce Heavy"/>
-            </a:endParaRPr>
-          </a:p>
-        </p:txBody>
-      </p:sp>
-      <p:sp>
-        <p:nvSpPr>
-          <p:cNvPr id="5" name="TextBox 5"/>
-          <p:cNvSpPr txBox="1"/>
-          <p:nvPr/>
-        </p:nvSpPr>
-        <p:spPr>
-          <a:xfrm>
-            <a:off x="1462216" y="243307"/>
-            <a:ext cx="9152238" cy="735073"/>
-          </a:xfrm>
-          <a:prstGeom prst="rect">
-            <a:avLst/>
-          </a:prstGeom>
-        </p:spPr>
-        <p:txBody>
-          <a:bodyPr wrap="square" lIns="0" tIns="0" rIns="0" bIns="0" rtlCol="0" anchor="t">
-            <a:spAutoFit/>
-          </a:bodyPr>
-          <a:lstStyle/>
-          <a:p>
-            <a:pPr algn="ctr" defTabSz="609630">
-              <a:lnSpc>
-                <a:spcPts val="6020"/>
-              </a:lnSpc>
-              <a:spcBef>
-                <a:spcPct val="0"/>
-              </a:spcBef>
-            </a:pPr>
-            <a:r>
-              <a:rPr lang="en-US" sz="4666" dirty="0">
-                <a:solidFill>
-                  <a:srgbClr val="000000"/>
-                </a:solidFill>
-                <a:latin typeface="Open Sauce Heavy"/>
-              </a:rPr>
-              <a:t>Cloud computation</a:t>
-            </a:r>
-          </a:p>
-        </p:txBody>
-      </p:sp>
-      <p:sp>
-        <p:nvSpPr>
-          <p:cNvPr id="6" name="CasellaDiTesto 5">
-            <a:extLst>
-              <a:ext uri="{FF2B5EF4-FFF2-40B4-BE49-F238E27FC236}">
-                <a16:creationId xmlns:a16="http://schemas.microsoft.com/office/drawing/2014/main" id="{B0026009-010A-542B-533D-D8C119725D36}"/>
-              </a:ext>
-            </a:extLst>
-          </p:cNvPr>
-          <p:cNvSpPr txBox="1"/>
-          <p:nvPr/>
-        </p:nvSpPr>
-        <p:spPr>
-          <a:xfrm>
-            <a:off x="1462216" y="2304621"/>
-            <a:ext cx="9267567" cy="1386149"/>
-          </a:xfrm>
-          <a:prstGeom prst="rect">
-            <a:avLst/>
-          </a:prstGeom>
-          <a:noFill/>
-        </p:spPr>
-        <p:txBody>
-          <a:bodyPr wrap="square" rtlCol="0">
-            <a:spAutoFit/>
-          </a:bodyPr>
-          <a:lstStyle/>
-          <a:p>
-            <a:pPr marL="914400" lvl="1" indent="-457200" defTabSz="609630">
-              <a:lnSpc>
-                <a:spcPts val="3422"/>
-              </a:lnSpc>
-              <a:buFont typeface="Arial" panose="020B0604020202020204" pitchFamily="34" charset="0"/>
-              <a:buChar char="•"/>
-            </a:pPr>
-            <a:r>
-              <a:rPr lang="it-IT" sz="2800" b="1" dirty="0"/>
-              <a:t>Position of the </a:t>
-            </a:r>
-            <a:r>
-              <a:rPr lang="it-IT" sz="2800" b="1" dirty="0" err="1"/>
-              <a:t>sensor</a:t>
-            </a:r>
-            <a:r>
-              <a:rPr lang="it-IT" sz="2800" b="1" dirty="0"/>
-              <a:t> </a:t>
-            </a:r>
-            <a:r>
-              <a:rPr lang="it-IT" sz="2800" dirty="0"/>
-              <a:t>: </a:t>
-            </a:r>
-            <a:r>
-              <a:rPr lang="it-IT" sz="2800" dirty="0" err="1"/>
-              <a:t>distance</a:t>
-            </a:r>
-            <a:r>
-              <a:rPr lang="it-IT" sz="2800" dirty="0"/>
-              <a:t> from the source (e.g. gas </a:t>
-            </a:r>
-            <a:r>
-              <a:rPr lang="it-IT" sz="2800" dirty="0" err="1"/>
-              <a:t>stove</a:t>
-            </a:r>
-            <a:r>
-              <a:rPr lang="it-IT" sz="2800" dirty="0"/>
-              <a:t>, boiler, gas storage)</a:t>
-            </a:r>
-          </a:p>
-          <a:p>
-            <a:pPr marL="914400" lvl="1" indent="-457200" defTabSz="609630">
-              <a:lnSpc>
-                <a:spcPts val="3422"/>
-              </a:lnSpc>
-              <a:buFont typeface="Arial" panose="020B0604020202020204" pitchFamily="34" charset="0"/>
-              <a:buChar char="•"/>
-            </a:pPr>
-            <a:r>
-              <a:rPr lang="it-IT" sz="2800" b="1" dirty="0"/>
-              <a:t>Position in </a:t>
-            </a:r>
-            <a:r>
-              <a:rPr lang="it-IT" sz="2800" b="1" dirty="0" err="1"/>
-              <a:t>respect</a:t>
-            </a:r>
-            <a:r>
-              <a:rPr lang="it-IT" sz="2800" b="1" dirty="0"/>
-              <a:t> to peer devices</a:t>
-            </a:r>
-          </a:p>
-        </p:txBody>
-      </p:sp>
-    </p:spTree>
-    <p:extLst>
-      <p:ext uri="{BB962C8B-B14F-4D97-AF65-F5344CB8AC3E}">
-        <p14:creationId xmlns:p14="http://schemas.microsoft.com/office/powerpoint/2010/main" val="73400370"/>
-      </p:ext>
-    </p:extLst>
-  </p:cSld>
-  <p:clrMapOvr>
-    <a:masterClrMapping/>
-  </p:clrMapOvr>
-  <p:transition spd="med">
-    <p:pull/>
-  </p:transition>
-</p:sld>
-</file>
-
 <file path=ppt/slides/slide2.xml><?xml version="1.0" encoding="utf-8"?>
 <p:sld xmlns:a="http://schemas.openxmlformats.org/drawingml/2006/main" xmlns:r="http://schemas.openxmlformats.org/officeDocument/2006/relationships" xmlns:p="http://schemas.openxmlformats.org/presentationml/2006/main">
   <p:cSld>
@@ -4598,7 +4456,7 @@
         <p:spPr>
           <a:xfrm>
             <a:off x="655361" y="2140121"/>
-            <a:ext cx="10881277" cy="2601866"/>
+            <a:ext cx="10881277" cy="3037883"/>
           </a:xfrm>
           <a:prstGeom prst="rect">
             <a:avLst/>
@@ -4782,7 +4640,7 @@
             </a:r>
             <a:r>
               <a:rPr lang="it-IT" sz="2800" dirty="0"/>
-              <a:t> standards for gas </a:t>
+              <a:t> standards for gas leaks </a:t>
             </a:r>
             <a:r>
               <a:rPr lang="it-IT" sz="2800" dirty="0" err="1"/>
@@ -5873,7 +5731,7 @@
             </a:pPr>
             <a:r>
               <a:rPr lang="it-IT" sz="2800" b="1" dirty="0"/>
-              <a:t>PYTHON</a:t>
+              <a:t>Python </a:t>
             </a:r>
             <a:r>
               <a:rPr lang="it-IT" sz="2800" dirty="0"/>
@@ -6033,7 +5891,15 @@
             </a:r>
             <a:r>
               <a:rPr lang="it-IT" sz="2800" dirty="0"/>
-              <a:t> (duration, </a:t>
+              <a:t> (</a:t>
+            </a:r>
+            <a:r>
+              <a:rPr lang="it-IT" sz="2800" dirty="0" err="1"/>
+              <a:t>alert</a:t>
+            </a:r>
+            <a:r>
+              <a:rPr lang="it-IT" sz="2800" dirty="0"/>
+              <a:t> duration, </a:t>
             </a:r>
             <a:r>
               <a:rPr lang="it-IT" sz="2800" dirty="0" err="1"/>
@@ -6106,7 +5972,7 @@
             </a:r>
             <a:r>
               <a:rPr lang="it-IT" sz="2800" dirty="0"/>
-              <a:t>(email).</a:t>
+              <a:t> (email).</a:t>
             </a:r>
             <a:endParaRPr lang="it-IT" sz="2800" b="1" dirty="0"/>
           </a:p>
@@ -6732,11 +6598,11 @@
             </a:r>
             <a:r>
               <a:rPr lang="it-IT" sz="2800" dirty="0"/>
-              <a:t> : 10% of LEL (Key </a:t>
+              <a:t> : 10% of LEL (key </a:t>
             </a:r>
             <a:r>
               <a:rPr lang="it-IT" sz="2800" dirty="0" err="1"/>
-              <a:t>Requirements</a:t>
+              <a:t>requirements</a:t>
             </a:r>
             <a:r>
               <a:rPr lang="it-IT" sz="2800" dirty="0"/>

</xml_diff>